<commit_message>
updating build for new template
</commit_message>
<xml_diff>
--- a/AZW_Azure_AD_Connect.pptx
+++ b/AZW_Azure_AD_Connect.pptx
@@ -187,8 +187,15 @@
         </p14:section>
       </p14:sectionLst>
     </p:ext>
+    <p:ext uri="{EFAFB233-063F-42B5-8137-9DF3F51BA10A}">
+      <p15:sldGuideLst xmlns:p15="http://schemas.microsoft.com/office/powerpoint/2012/main"/>
+    </p:ext>
   </p:extLst>
 </p:presentation>
+</file>
+
+<file path=ppt/revisionInfo.xml><?xml version="1.0" encoding="utf-8"?>
+<p1510:revInfo xmlns:a="http://schemas.openxmlformats.org/drawingml/2006/main" xmlns:r="http://schemas.openxmlformats.org/officeDocument/2006/relationships" xmlns:p1510="http://schemas.microsoft.com/office/powerpoint/2015/10/main"/>
 </file>
 
 <file path=ppt/notesMasters/notesMaster1.xml><?xml version="1.0" encoding="utf-8"?>
@@ -273,7 +280,7 @@
           <a:p>
             <a:fld id="{9E086F58-34FA-4093-86D2-9FFA245ACFA6}" type="datetimeFigureOut">
               <a:rPr lang="en-US" smtClean="0"/>
-              <a:t>4/27/2017</a:t>
+              <a:t>7/18/2017</a:t>
             </a:fld>
             <a:endParaRPr lang="en-US"/>
           </a:p>

</xml_diff>